<commit_message>
modify ppt03 04 05
</commit_message>
<xml_diff>
--- a/课程PPT/03.JavaScript语法、表达式及语句、运算符（1、逻辑运算符进阶）.pptx
+++ b/课程PPT/03.JavaScript语法、表达式及语句、运算符（1、逻辑运算符进阶）.pptx
@@ -16972,7 +16972,7 @@
         </p:nvSpPr>
         <p:spPr>
           <a:xfrm>
-            <a:off x="5434330" y="5437505"/>
+            <a:off x="5434330" y="6011545"/>
             <a:ext cx="5849620" cy="460375"/>
           </a:xfrm>
           <a:prstGeom prst="rect">
@@ -17049,7 +17049,7 @@
         </p:nvSpPr>
         <p:spPr>
           <a:xfrm>
-            <a:off x="5434330" y="5969635"/>
+            <a:off x="5434330" y="5610860"/>
             <a:ext cx="3556000" cy="398780"/>
           </a:xfrm>
           <a:prstGeom prst="rect">
@@ -17495,7 +17495,7 @@
                                           </p:stCondLst>
                                         </p:cTn>
                                         <p:tgtEl>
-                                          <p:spTgt spid="6"/>
+                                          <p:spTgt spid="7"/>
                                         </p:tgtEl>
                                         <p:attrNameLst>
                                           <p:attrName>style.visibility</p:attrName>
@@ -17509,7 +17509,7 @@
                                       <p:cBhvr additive="base">
                                         <p:cTn id="28" dur="500" fill="hold"/>
                                         <p:tgtEl>
-                                          <p:spTgt spid="6"/>
+                                          <p:spTgt spid="7"/>
                                         </p:tgtEl>
                                         <p:attrNameLst>
                                           <p:attrName>ppt_x</p:attrName>
@@ -17532,7 +17532,7 @@
                                       <p:cBhvr additive="base">
                                         <p:cTn id="29" dur="500" fill="hold"/>
                                         <p:tgtEl>
-                                          <p:spTgt spid="6"/>
+                                          <p:spTgt spid="7"/>
                                         </p:tgtEl>
                                         <p:attrNameLst>
                                           <p:attrName>ppt_y</p:attrName>
@@ -17577,7 +17577,7 @@
                                           </p:stCondLst>
                                         </p:cTn>
                                         <p:tgtEl>
-                                          <p:spTgt spid="7"/>
+                                          <p:spTgt spid="6"/>
                                         </p:tgtEl>
                                         <p:attrNameLst>
                                           <p:attrName>style.visibility</p:attrName>
@@ -17591,7 +17591,7 @@
                                       <p:cBhvr additive="base">
                                         <p:cTn id="33" dur="500" fill="hold"/>
                                         <p:tgtEl>
-                                          <p:spTgt spid="7"/>
+                                          <p:spTgt spid="6"/>
                                         </p:tgtEl>
                                         <p:attrNameLst>
                                           <p:attrName>ppt_x</p:attrName>
@@ -17614,7 +17614,7 @@
                                       <p:cBhvr additive="base">
                                         <p:cTn id="34" dur="500" fill="hold"/>
                                         <p:tgtEl>
-                                          <p:spTgt spid="7"/>
+                                          <p:spTgt spid="6"/>
                                         </p:tgtEl>
                                         <p:attrNameLst>
                                           <p:attrName>ppt_y</p:attrName>
@@ -17967,7 +17967,7 @@
         </p:nvSpPr>
         <p:spPr>
           <a:xfrm>
-            <a:off x="7091045" y="5379720"/>
+            <a:off x="7091045" y="5451475"/>
             <a:ext cx="3374390" cy="398780"/>
           </a:xfrm>
           <a:prstGeom prst="rect">

</xml_diff>